<commit_message>
add web fix links update avd
</commit_message>
<xml_diff>
--- a/courses/oopjava/lecture1.pptx
+++ b/courses/oopjava/lecture1.pptx
@@ -266,7 +266,7 @@
             <a:fld id="{CB44B6B1-5441-9644-AE1C-BB7EA5DBA264}" type="datetimeFigureOut">
               <a:rPr lang="en-US" smtClean="0"/>
               <a:pPr/>
-              <a:t>9/14/18</a:t>
+              <a:t>06/09/2019</a:t>
             </a:fld>
             <a:endParaRPr lang="en-US"/>
           </a:p>
@@ -434,7 +434,7 @@
             <a:fld id="{41878819-472C-A14B-95BF-39C94BA106B2}" type="datetimeFigureOut">
               <a:rPr lang="en-US" smtClean="0"/>
               <a:pPr/>
-              <a:t>9/14/18</a:t>
+              <a:t>06/09/2019</a:t>
             </a:fld>
             <a:endParaRPr lang="en-US"/>
           </a:p>
@@ -8389,7 +8389,7 @@
           <a:noFill/>
           <a:extLst>
             <a:ext uri="{909E8E84-426E-40dd-AFC4-6F175D3DCCD1}">
-              <a14:hiddenFill xmlns:a14="http://schemas.microsoft.com/office/drawing/2010/main" xmlns="">
+              <a14:hiddenFill xmlns="" xmlns:a14="http://schemas.microsoft.com/office/drawing/2010/main">
                 <a:solidFill>
                   <a:srgbClr val="FFFFFF"/>
                 </a:solidFill>
@@ -8430,7 +8430,7 @@
           <a:noFill/>
           <a:extLst>
             <a:ext uri="{909E8E84-426E-40dd-AFC4-6F175D3DCCD1}">
-              <a14:hiddenFill xmlns:a14="http://schemas.microsoft.com/office/drawing/2010/main" xmlns="">
+              <a14:hiddenFill xmlns="" xmlns:a14="http://schemas.microsoft.com/office/drawing/2010/main">
                 <a:solidFill>
                   <a:srgbClr val="FFFFFF"/>
                 </a:solidFill>
@@ -8634,7 +8634,7 @@
           <a:noFill/>
           <a:extLst>
             <a:ext uri="{909E8E84-426E-40dd-AFC4-6F175D3DCCD1}">
-              <a14:hiddenFill xmlns:a14="http://schemas.microsoft.com/office/drawing/2010/main" xmlns="">
+              <a14:hiddenFill xmlns="" xmlns:a14="http://schemas.microsoft.com/office/drawing/2010/main">
                 <a:solidFill>
                   <a:srgbClr val="FFFFFF"/>
                 </a:solidFill>
@@ -8981,14 +8981,14 @@
           <a:effectLst/>
           <a:extLst>
             <a:ext uri="{909E8E84-426E-40dd-AFC4-6F175D3DCCD1}">
-              <a14:hiddenFill xmlns:a14="http://schemas.microsoft.com/office/drawing/2010/main" xmlns="">
+              <a14:hiddenFill xmlns="" xmlns:a14="http://schemas.microsoft.com/office/drawing/2010/main">
                 <a:solidFill>
                   <a:schemeClr val="accent1"/>
                 </a:solidFill>
               </a14:hiddenFill>
             </a:ext>
             <a:ext uri="{AF507438-7753-43e0-B8FC-AC1667EBCBE1}">
-              <a14:hiddenEffects xmlns:a14="http://schemas.microsoft.com/office/drawing/2010/main" xmlns="">
+              <a14:hiddenEffects xmlns="" xmlns:a14="http://schemas.microsoft.com/office/drawing/2010/main">
                 <a:effectLst>
                   <a:outerShdw blurRad="63500" dist="38099" dir="2700000" algn="ctr" rotWithShape="0">
                     <a:schemeClr val="bg2">
@@ -10024,10 +10024,9 @@
           <a:p>
             <a:pPr lvl="0"/>
             <a:r>
-              <a:rPr lang="en-US"/>
+              <a:rPr lang="en-US" dirty="0"/>
               <a:t>Java book: chapter 1-5</a:t>
             </a:r>
-            <a:endParaRPr lang="en-US" dirty="0"/>
           </a:p>
           <a:p>
             <a:pPr lvl="0"/>
@@ -10227,8 +10226,28 @@
           <a:p>
             <a:pPr lvl="0"/>
             <a:r>
+              <a:rPr lang="en-GB"/>
+              <a:t>2 </a:t>
+            </a:r>
+            <a:r>
               <a:rPr lang="en-GB" dirty="0"/>
-              <a:t>5 assignments account for 50% of total score, final project accounts for 40% of total score.</a:t>
+              <a:t>assignments account </a:t>
+            </a:r>
+            <a:r>
+              <a:rPr lang="en-GB"/>
+              <a:t>for 40</a:t>
+            </a:r>
+            <a:r>
+              <a:rPr lang="en-GB" dirty="0"/>
+              <a:t>% of total score, final project accounts </a:t>
+            </a:r>
+            <a:r>
+              <a:rPr lang="en-GB"/>
+              <a:t>for 50</a:t>
+            </a:r>
+            <a:r>
+              <a:rPr lang="en-GB" dirty="0"/>
+              <a:t>% of total score.</a:t>
             </a:r>
             <a:endParaRPr lang="en-US" b="1" dirty="0"/>
           </a:p>
@@ -11730,7 +11749,7 @@
           <a:noFill/>
           <a:extLst>
             <a:ext uri="{909E8E84-426E-40dd-AFC4-6F175D3DCCD1}">
-              <a14:hiddenFill xmlns:a14="http://schemas.microsoft.com/office/drawing/2010/main" xmlns="">
+              <a14:hiddenFill xmlns="" xmlns:a14="http://schemas.microsoft.com/office/drawing/2010/main">
                 <a:solidFill>
                   <a:srgbClr val="FFFFFF"/>
                 </a:solidFill>
@@ -12132,7 +12151,7 @@
           <a:noFill/>
           <a:extLst>
             <a:ext uri="{909E8E84-426E-40dd-AFC4-6F175D3DCCD1}">
-              <a14:hiddenFill xmlns:a14="http://schemas.microsoft.com/office/drawing/2010/main" xmlns="">
+              <a14:hiddenFill xmlns="" xmlns:a14="http://schemas.microsoft.com/office/drawing/2010/main">
                 <a:solidFill>
                   <a:srgbClr val="FFFFFF"/>
                 </a:solidFill>

</xml_diff>